<commit_message>
Update Your Brain Lies to You.pptx
</commit_message>
<xml_diff>
--- a/Lunch and Learns/Your Brain Lies to You.pptx
+++ b/Lunch and Learns/Your Brain Lies to You.pptx
@@ -142,7 +142,7 @@
 <file path=ppt/revisionInfo.xml><?xml version="1.0" encoding="utf-8"?>
 <p1510:revInfo xmlns:a="http://schemas.openxmlformats.org/drawingml/2006/main" xmlns:r="http://schemas.openxmlformats.org/officeDocument/2006/relationships" xmlns:p1510="http://schemas.microsoft.com/office/powerpoint/2015/10/main">
   <p1510:revLst>
-    <p1510:client id="{60B99C7B-4B10-4C5B-B33C-058BA9C01405}" v="305" dt="2020-04-16T01:03:21.028"/>
+    <p1510:client id="{60B99C7B-4B10-4C5B-B33C-058BA9C01405}" v="321" dt="2020-04-16T01:32:46.118"/>
   </p1510:revLst>
 </p1510:revInfo>
 </file>
@@ -152,7 +152,7 @@
   <pc:docChgLst>
     <pc:chgData name="william a" userId="c66c7249b60d4ab2" providerId="LiveId" clId="{60B99C7B-4B10-4C5B-B33C-058BA9C01405}"/>
     <pc:docChg chg="undo custSel addSld delSld modSld">
-      <pc:chgData name="william a" userId="c66c7249b60d4ab2" providerId="LiveId" clId="{60B99C7B-4B10-4C5B-B33C-058BA9C01405}" dt="2020-04-16T01:03:43.880" v="4873" actId="6549"/>
+      <pc:chgData name="william a" userId="c66c7249b60d4ab2" providerId="LiveId" clId="{60B99C7B-4B10-4C5B-B33C-058BA9C01405}" dt="2020-04-16T01:52:18.776" v="5049" actId="20577"/>
       <pc:docMkLst>
         <pc:docMk/>
       </pc:docMkLst>
@@ -188,7 +188,7 @@
         </pc:picChg>
       </pc:sldChg>
       <pc:sldChg chg="modSp modNotesTx">
-        <pc:chgData name="william a" userId="c66c7249b60d4ab2" providerId="LiveId" clId="{60B99C7B-4B10-4C5B-B33C-058BA9C01405}" dt="2020-04-16T00:46:52.228" v="3774" actId="2711"/>
+        <pc:chgData name="william a" userId="c66c7249b60d4ab2" providerId="LiveId" clId="{60B99C7B-4B10-4C5B-B33C-058BA9C01405}" dt="2020-04-16T01:52:18.776" v="5049" actId="20577"/>
         <pc:sldMkLst>
           <pc:docMk/>
           <pc:sldMk cId="1728407613" sldId="258"/>
@@ -621,7 +621,7 @@
         </pc:cxnChg>
       </pc:sldChg>
       <pc:sldChg chg="addSp delSp modSp add modAnim modNotesTx">
-        <pc:chgData name="william a" userId="c66c7249b60d4ab2" providerId="LiveId" clId="{60B99C7B-4B10-4C5B-B33C-058BA9C01405}" dt="2020-04-16T00:49:20.147" v="3857" actId="20577"/>
+        <pc:chgData name="william a" userId="c66c7249b60d4ab2" providerId="LiveId" clId="{60B99C7B-4B10-4C5B-B33C-058BA9C01405}" dt="2020-04-16T01:47:42.975" v="5039" actId="20577"/>
         <pc:sldMkLst>
           <pc:docMk/>
           <pc:sldMk cId="2898531783" sldId="265"/>
@@ -666,6 +666,22 @@
             <ac:picMk id="11" creationId="{3A6FB861-6429-41D6-AAC6-5B98620B0811}"/>
           </ac:picMkLst>
         </pc:picChg>
+        <pc:picChg chg="add del">
+          <ac:chgData name="william a" userId="c66c7249b60d4ab2" providerId="LiveId" clId="{60B99C7B-4B10-4C5B-B33C-058BA9C01405}" dt="2020-04-16T01:32:43.808" v="5036"/>
+          <ac:picMkLst>
+            <pc:docMk/>
+            <pc:sldMk cId="2898531783" sldId="265"/>
+            <ac:picMk id="13" creationId="{55436CF0-7716-4FAC-A37F-3F0E74D19874}"/>
+          </ac:picMkLst>
+        </pc:picChg>
+        <pc:picChg chg="add">
+          <ac:chgData name="william a" userId="c66c7249b60d4ab2" providerId="LiveId" clId="{60B99C7B-4B10-4C5B-B33C-058BA9C01405}" dt="2020-04-16T01:32:46.118" v="5038"/>
+          <ac:picMkLst>
+            <pc:docMk/>
+            <pc:sldMk cId="2898531783" sldId="265"/>
+            <ac:picMk id="14" creationId="{20A975DF-91BA-4834-B6E8-E84D5104DF12}"/>
+          </ac:picMkLst>
+        </pc:picChg>
         <pc:picChg chg="mod">
           <ac:chgData name="william a" userId="c66c7249b60d4ab2" providerId="LiveId" clId="{60B99C7B-4B10-4C5B-B33C-058BA9C01405}" dt="2020-04-16T00:46:14.989" v="3764" actId="1076"/>
           <ac:picMkLst>
@@ -706,8 +722,8 @@
             <ac:picMk id="7174" creationId="{6333B087-AEF1-4904-9F9F-FFB7F29EF145}"/>
           </ac:picMkLst>
         </pc:picChg>
-        <pc:picChg chg="add mod">
-          <ac:chgData name="william a" userId="c66c7249b60d4ab2" providerId="LiveId" clId="{60B99C7B-4B10-4C5B-B33C-058BA9C01405}" dt="2020-04-16T00:46:14.989" v="3764" actId="1076"/>
+        <pc:picChg chg="add del mod">
+          <ac:chgData name="william a" userId="c66c7249b60d4ab2" providerId="LiveId" clId="{60B99C7B-4B10-4C5B-B33C-058BA9C01405}" dt="2020-04-16T01:32:44.793" v="5037" actId="478"/>
           <ac:picMkLst>
             <pc:docMk/>
             <pc:sldMk cId="2898531783" sldId="265"/>
@@ -716,7 +732,7 @@
         </pc:picChg>
       </pc:sldChg>
       <pc:sldChg chg="addSp delSp modSp add modAnim modNotesTx">
-        <pc:chgData name="william a" userId="c66c7249b60d4ab2" providerId="LiveId" clId="{60B99C7B-4B10-4C5B-B33C-058BA9C01405}" dt="2020-04-16T00:48:55.461" v="3854" actId="20577"/>
+        <pc:chgData name="william a" userId="c66c7249b60d4ab2" providerId="LiveId" clId="{60B99C7B-4B10-4C5B-B33C-058BA9C01405}" dt="2020-04-16T01:32:36.072" v="5034" actId="1035"/>
         <pc:sldMkLst>
           <pc:docMk/>
           <pc:sldMk cId="1609715807" sldId="266"/>
@@ -777,8 +793,8 @@
             <ac:picMk id="10" creationId="{A48D1EF5-C6B8-4B22-BF34-427DC31EBF70}"/>
           </ac:picMkLst>
         </pc:picChg>
-        <pc:picChg chg="add">
-          <ac:chgData name="william a" userId="c66c7249b60d4ab2" providerId="LiveId" clId="{60B99C7B-4B10-4C5B-B33C-058BA9C01405}" dt="2020-04-16T00:46:19.201" v="3767"/>
+        <pc:picChg chg="add mod">
+          <ac:chgData name="william a" userId="c66c7249b60d4ab2" providerId="LiveId" clId="{60B99C7B-4B10-4C5B-B33C-058BA9C01405}" dt="2020-04-16T01:32:36.072" v="5034" actId="1035"/>
           <ac:picMkLst>
             <pc:docMk/>
             <pc:sldMk cId="1609715807" sldId="266"/>
@@ -920,7 +936,7 @@
         </pc:spChg>
       </pc:sldChg>
       <pc:sldChg chg="addSp delSp modSp add modNotesTx">
-        <pc:chgData name="william a" userId="c66c7249b60d4ab2" providerId="LiveId" clId="{60B99C7B-4B10-4C5B-B33C-058BA9C01405}" dt="2020-04-16T01:02:00.093" v="4758" actId="20577"/>
+        <pc:chgData name="william a" userId="c66c7249b60d4ab2" providerId="LiveId" clId="{60B99C7B-4B10-4C5B-B33C-058BA9C01405}" dt="2020-04-16T01:31:18.983" v="5022" actId="20577"/>
         <pc:sldMkLst>
           <pc:docMk/>
           <pc:sldMk cId="3550611146" sldId="269"/>
@@ -1670,7 +1686,7 @@
           <a:p>
             <a:r>
               <a:rPr lang="en-US" sz="1200" dirty="0"/>
-              <a:t>The brain activity observed when asking a subject to recall a specific incident in their past, and then envision themselves in a specific future scenario, are virtually the SAME. The participants in this 2007 study were also asked to remember a non-personal memory about a random subject, at this point, past president Bill Clinton. That’s that gray dotted line.</a:t>
+              <a:t>The brain activity observed when asking a subject to recall a specific incident in their past, and then envision themselves in a specific future scenario, are virtually the SAME. The participants in this 2007 study were also asked to remember a non-personal memory about a random subject, in this study, a non-personal memory of past president Bill Clinton. That’s that gray “Clinton-Imagine” dotted line.</a:t>
             </a:r>
           </a:p>
           <a:p>
@@ -1679,16 +1695,7 @@
           <a:p>
             <a:r>
               <a:rPr lang="en-US" sz="1200" dirty="0"/>
-              <a:t>The non-personal memory and non-personal future scenario projection differed from the random subject brain patterns.</a:t>
-            </a:r>
-          </a:p>
-          <a:p>
-            <a:endParaRPr lang="en-US" sz="1200" dirty="0"/>
-          </a:p>
-          <a:p>
-            <a:r>
-              <a:rPr lang="en-US" sz="1200" dirty="0"/>
-              <a:t>The brain constructs memory the same way it constructs future scenarios. </a:t>
+              <a:t>The brain constructs personal memory the same way it constructs future scenarios, but differently from other recall other facts and figures.</a:t>
             </a:r>
           </a:p>
           <a:p>
@@ -2027,7 +2034,31 @@
                 <a:ea typeface="+mn-ea"/>
                 <a:cs typeface="+mn-cs"/>
               </a:rPr>
-              <a:t>It takes dozens milliseconds for information from the eye to reach the brain, and about 120ms before we can make use of that information.</a:t>
+              <a:t>It takes dozens milliseconds for information from the eye to reach the brain, </a:t>
+            </a:r>
+            <a:r>
+              <a:rPr lang="en-US" sz="1200" b="0" i="0" kern="1200">
+                <a:solidFill>
+                  <a:schemeClr val="tx1"/>
+                </a:solidFill>
+                <a:effectLst/>
+                <a:latin typeface="+mn-lt"/>
+                <a:ea typeface="+mn-ea"/>
+                <a:cs typeface="+mn-cs"/>
+              </a:rPr>
+              <a:t>and another 120ms </a:t>
+            </a:r>
+            <a:r>
+              <a:rPr lang="en-US" sz="1200" b="0" i="0" kern="1200" dirty="0">
+                <a:solidFill>
+                  <a:schemeClr val="tx1"/>
+                </a:solidFill>
+                <a:effectLst/>
+                <a:latin typeface="+mn-lt"/>
+                <a:ea typeface="+mn-ea"/>
+                <a:cs typeface="+mn-cs"/>
+              </a:rPr>
+              <a:t>before we can make use of that information.</a:t>
             </a:r>
           </a:p>
           <a:p>
@@ -3359,6 +3390,17 @@
               <a:rPr lang="en-US" dirty="0"/>
               <a:t>The scientists looked at brain activity observing a normal clockwise motion.</a:t>
             </a:r>
+          </a:p>
+          <a:p>
+            <a:endParaRPr lang="en-US" sz="1200" b="0" i="0" kern="1200" dirty="0">
+              <a:solidFill>
+                <a:schemeClr val="tx1"/>
+              </a:solidFill>
+              <a:effectLst/>
+              <a:latin typeface="+mn-lt"/>
+              <a:ea typeface="+mn-ea"/>
+              <a:cs typeface="+mn-cs"/>
+            </a:endParaRPr>
           </a:p>
           <a:p>
             <a:endParaRPr lang="en-US" sz="1200" b="0" i="0" kern="1200" dirty="0">
@@ -6988,10 +7030,10 @@
       </p:pic>
       <p:pic>
         <p:nvPicPr>
-          <p:cNvPr id="9218" name="Picture 2" descr="Brain-controlled robots | MIT News">
+          <p:cNvPr id="14" name="Picture 2" descr="Brain-controlled robots | MIT News">
             <a:extLst>
               <a:ext uri="{FF2B5EF4-FFF2-40B4-BE49-F238E27FC236}">
-                <a16:creationId xmlns:a16="http://schemas.microsoft.com/office/drawing/2014/main" id="{932445E4-4A23-4D22-BCD6-B527F2A7FF7E}"/>
+                <a16:creationId xmlns:a16="http://schemas.microsoft.com/office/drawing/2014/main" id="{20A975DF-91BA-4834-B6E8-E84D5104DF12}"/>
               </a:ext>
             </a:extLst>
           </p:cNvPr>
@@ -7077,7 +7119,7 @@
         </p:blipFill>
         <p:spPr bwMode="auto">
           <a:xfrm>
-            <a:off x="117809" y="838336"/>
+            <a:off x="18059" y="738586"/>
             <a:ext cx="4613675" cy="3075783"/>
           </a:xfrm>
           <a:prstGeom prst="rect">
@@ -7595,7 +7637,7 @@
         </p:blipFill>
         <p:spPr bwMode="auto">
           <a:xfrm>
-            <a:off x="117809" y="838336"/>
+            <a:off x="18059" y="738586"/>
             <a:ext cx="4613675" cy="3075783"/>
           </a:xfrm>
           <a:prstGeom prst="rect">

</xml_diff>